<commit_message>
modification powerpoint + doc
</commit_message>
<xml_diff>
--- a/web/PPE Projet Parking.pptx
+++ b/web/PPE Projet Parking.pptx
@@ -8,6 +8,9 @@
     <p:sldId id="256" r:id="rId2"/>
     <p:sldId id="257" r:id="rId3"/>
     <p:sldId id="258" r:id="rId4"/>
+    <p:sldId id="259" r:id="rId5"/>
+    <p:sldId id="260" r:id="rId6"/>
+    <p:sldId id="261" r:id="rId7"/>
   </p:sldIdLst>
   <p:sldSz cx="12192000" cy="6858000"/>
   <p:notesSz cx="6858000" cy="9144000"/>
@@ -306,7 +309,7 @@
           <a:p>
             <a:fld id="{810E94BB-6A8F-4597-8B7A-8F7F2E664C76}" type="datetimeFigureOut">
               <a:rPr lang="fr-FR" smtClean="0"/>
-              <a:t>27/10/2017</a:t>
+              <a:t>29/10/2017</a:t>
             </a:fld>
             <a:endParaRPr lang="fr-FR"/>
           </a:p>
@@ -644,7 +647,7 @@
           <a:p>
             <a:fld id="{810E94BB-6A8F-4597-8B7A-8F7F2E664C76}" type="datetimeFigureOut">
               <a:rPr lang="fr-FR" smtClean="0"/>
-              <a:t>27/10/2017</a:t>
+              <a:t>29/10/2017</a:t>
             </a:fld>
             <a:endParaRPr lang="fr-FR"/>
           </a:p>
@@ -1045,7 +1048,7 @@
           <a:p>
             <a:fld id="{810E94BB-6A8F-4597-8B7A-8F7F2E664C76}" type="datetimeFigureOut">
               <a:rPr lang="fr-FR" smtClean="0"/>
-              <a:t>27/10/2017</a:t>
+              <a:t>29/10/2017</a:t>
             </a:fld>
             <a:endParaRPr lang="fr-FR"/>
           </a:p>
@@ -1381,7 +1384,7 @@
           <a:p>
             <a:fld id="{810E94BB-6A8F-4597-8B7A-8F7F2E664C76}" type="datetimeFigureOut">
               <a:rPr lang="fr-FR" smtClean="0"/>
-              <a:t>27/10/2017</a:t>
+              <a:t>29/10/2017</a:t>
             </a:fld>
             <a:endParaRPr lang="fr-FR"/>
           </a:p>
@@ -1701,7 +1704,7 @@
           <a:p>
             <a:fld id="{810E94BB-6A8F-4597-8B7A-8F7F2E664C76}" type="datetimeFigureOut">
               <a:rPr lang="fr-FR" smtClean="0"/>
-              <a:t>27/10/2017</a:t>
+              <a:t>29/10/2017</a:t>
             </a:fld>
             <a:endParaRPr lang="fr-FR"/>
           </a:p>
@@ -2097,7 +2100,7 @@
           <a:p>
             <a:fld id="{810E94BB-6A8F-4597-8B7A-8F7F2E664C76}" type="datetimeFigureOut">
               <a:rPr lang="fr-FR" smtClean="0"/>
-              <a:t>27/10/2017</a:t>
+              <a:t>29/10/2017</a:t>
             </a:fld>
             <a:endParaRPr lang="fr-FR"/>
           </a:p>
@@ -2354,7 +2357,7 @@
           <a:p>
             <a:fld id="{810E94BB-6A8F-4597-8B7A-8F7F2E664C76}" type="datetimeFigureOut">
               <a:rPr lang="fr-FR" smtClean="0"/>
-              <a:t>27/10/2017</a:t>
+              <a:t>29/10/2017</a:t>
             </a:fld>
             <a:endParaRPr lang="fr-FR"/>
           </a:p>
@@ -2616,7 +2619,7 @@
           <a:p>
             <a:fld id="{810E94BB-6A8F-4597-8B7A-8F7F2E664C76}" type="datetimeFigureOut">
               <a:rPr lang="fr-FR" smtClean="0"/>
-              <a:t>27/10/2017</a:t>
+              <a:t>29/10/2017</a:t>
             </a:fld>
             <a:endParaRPr lang="fr-FR"/>
           </a:p>
@@ -2878,7 +2881,7 @@
           <a:p>
             <a:fld id="{810E94BB-6A8F-4597-8B7A-8F7F2E664C76}" type="datetimeFigureOut">
               <a:rPr lang="fr-FR" smtClean="0"/>
-              <a:t>27/10/2017</a:t>
+              <a:t>29/10/2017</a:t>
             </a:fld>
             <a:endParaRPr lang="fr-FR"/>
           </a:p>
@@ -3207,7 +3210,7 @@
           <a:p>
             <a:fld id="{810E94BB-6A8F-4597-8B7A-8F7F2E664C76}" type="datetimeFigureOut">
               <a:rPr lang="fr-FR" smtClean="0"/>
-              <a:t>27/10/2017</a:t>
+              <a:t>29/10/2017</a:t>
             </a:fld>
             <a:endParaRPr lang="fr-FR"/>
           </a:p>
@@ -3530,7 +3533,7 @@
           <a:p>
             <a:fld id="{810E94BB-6A8F-4597-8B7A-8F7F2E664C76}" type="datetimeFigureOut">
               <a:rPr lang="fr-FR" smtClean="0"/>
-              <a:t>27/10/2017</a:t>
+              <a:t>29/10/2017</a:t>
             </a:fld>
             <a:endParaRPr lang="fr-FR"/>
           </a:p>
@@ -3987,7 +3990,7 @@
           <a:p>
             <a:fld id="{810E94BB-6A8F-4597-8B7A-8F7F2E664C76}" type="datetimeFigureOut">
               <a:rPr lang="fr-FR" smtClean="0"/>
-              <a:t>27/10/2017</a:t>
+              <a:t>29/10/2017</a:t>
             </a:fld>
             <a:endParaRPr lang="fr-FR"/>
           </a:p>
@@ -4192,7 +4195,7 @@
           <a:p>
             <a:fld id="{810E94BB-6A8F-4597-8B7A-8F7F2E664C76}" type="datetimeFigureOut">
               <a:rPr lang="fr-FR" smtClean="0"/>
-              <a:t>27/10/2017</a:t>
+              <a:t>29/10/2017</a:t>
             </a:fld>
             <a:endParaRPr lang="fr-FR"/>
           </a:p>
@@ -4369,7 +4372,7 @@
           <a:p>
             <a:fld id="{810E94BB-6A8F-4597-8B7A-8F7F2E664C76}" type="datetimeFigureOut">
               <a:rPr lang="fr-FR" smtClean="0"/>
-              <a:t>27/10/2017</a:t>
+              <a:t>29/10/2017</a:t>
             </a:fld>
             <a:endParaRPr lang="fr-FR"/>
           </a:p>
@@ -4702,7 +4705,7 @@
           <a:p>
             <a:fld id="{810E94BB-6A8F-4597-8B7A-8F7F2E664C76}" type="datetimeFigureOut">
               <a:rPr lang="fr-FR" smtClean="0"/>
-              <a:t>27/10/2017</a:t>
+              <a:t>29/10/2017</a:t>
             </a:fld>
             <a:endParaRPr lang="fr-FR"/>
           </a:p>
@@ -5047,7 +5050,7 @@
           <a:p>
             <a:fld id="{810E94BB-6A8F-4597-8B7A-8F7F2E664C76}" type="datetimeFigureOut">
               <a:rPr lang="fr-FR" smtClean="0"/>
-              <a:t>27/10/2017</a:t>
+              <a:t>29/10/2017</a:t>
             </a:fld>
             <a:endParaRPr lang="fr-FR"/>
           </a:p>
@@ -7164,7 +7167,7 @@
           <a:p>
             <a:fld id="{810E94BB-6A8F-4597-8B7A-8F7F2E664C76}" type="datetimeFigureOut">
               <a:rPr lang="fr-FR" smtClean="0"/>
-              <a:t>27/10/2017</a:t>
+              <a:t>29/10/2017</a:t>
             </a:fld>
             <a:endParaRPr lang="fr-FR"/>
           </a:p>
@@ -8004,7 +8007,7 @@
           <a:p>
             <a:r>
               <a:rPr lang="fr-FR" dirty="0"/>
-              <a:t>Mise en place d’une solution de partage </a:t>
+              <a:t>Mise en place d’une solution de partage pour faciliter le travail de groupe en temps réel</a:t>
             </a:r>
           </a:p>
         </p:txBody>
@@ -8013,6 +8016,446 @@
     <p:extLst>
       <p:ext uri="{BB962C8B-B14F-4D97-AF65-F5344CB8AC3E}">
         <p14:creationId xmlns:p14="http://schemas.microsoft.com/office/powerpoint/2010/main" val="3652730696"/>
+      </p:ext>
+    </p:extLst>
+  </p:cSld>
+  <p:clrMapOvr>
+    <a:masterClrMapping/>
+  </p:clrMapOvr>
+</p:sld>
+</file>
+
+<file path=ppt/slides/slide4.xml><?xml version="1.0" encoding="utf-8"?>
+<p:sld xmlns:a="http://schemas.openxmlformats.org/drawingml/2006/main" xmlns:r="http://schemas.openxmlformats.org/officeDocument/2006/relationships" xmlns:p="http://schemas.openxmlformats.org/presentationml/2006/main">
+  <p:cSld>
+    <p:spTree>
+      <p:nvGrpSpPr>
+        <p:cNvPr id="1" name=""/>
+        <p:cNvGrpSpPr/>
+        <p:nvPr/>
+      </p:nvGrpSpPr>
+      <p:grpSpPr>
+        <a:xfrm>
+          <a:off x="0" y="0"/>
+          <a:ext cx="0" cy="0"/>
+          <a:chOff x="0" y="0"/>
+          <a:chExt cx="0" cy="0"/>
+        </a:xfrm>
+      </p:grpSpPr>
+      <p:sp>
+        <p:nvSpPr>
+          <p:cNvPr id="2" name="Titre 1">
+            <a:extLst>
+              <a:ext uri="{FF2B5EF4-FFF2-40B4-BE49-F238E27FC236}">
+                <a16:creationId xmlns:a16="http://schemas.microsoft.com/office/drawing/2014/main" id="{DBAFFEDE-4760-4DD0-94A2-C2A60A431A36}"/>
+              </a:ext>
+            </a:extLst>
+          </p:cNvPr>
+          <p:cNvSpPr>
+            <a:spLocks noGrp="1"/>
+          </p:cNvSpPr>
+          <p:nvPr>
+            <p:ph type="title"/>
+          </p:nvPr>
+        </p:nvSpPr>
+        <p:spPr/>
+        <p:txBody>
+          <a:bodyPr/>
+          <a:lstStyle/>
+          <a:p>
+            <a:pPr algn="ctr"/>
+            <a:r>
+              <a:rPr lang="fr-FR" dirty="0"/>
+              <a:t>Architecture</a:t>
+            </a:r>
+          </a:p>
+        </p:txBody>
+      </p:sp>
+      <p:sp>
+        <p:nvSpPr>
+          <p:cNvPr id="3" name="Espace réservé du contenu 2">
+            <a:extLst>
+              <a:ext uri="{FF2B5EF4-FFF2-40B4-BE49-F238E27FC236}">
+                <a16:creationId xmlns:a16="http://schemas.microsoft.com/office/drawing/2014/main" id="{97480A3A-DB12-478A-8DCF-7BBD7557426E}"/>
+              </a:ext>
+            </a:extLst>
+          </p:cNvPr>
+          <p:cNvSpPr>
+            <a:spLocks noGrp="1"/>
+          </p:cNvSpPr>
+          <p:nvPr>
+            <p:ph idx="1"/>
+          </p:nvPr>
+        </p:nvSpPr>
+        <p:spPr/>
+        <p:txBody>
+          <a:bodyPr/>
+          <a:lstStyle/>
+          <a:p>
+            <a:r>
+              <a:rPr lang="fr-FR" dirty="0"/>
+              <a:t>Choix de l’architecture MVC</a:t>
+            </a:r>
+          </a:p>
+          <a:p>
+            <a:pPr lvl="1"/>
+            <a:r>
+              <a:rPr lang="fr-FR" dirty="0"/>
+              <a:t>Model</a:t>
+            </a:r>
+          </a:p>
+          <a:p>
+            <a:pPr lvl="1"/>
+            <a:r>
+              <a:rPr lang="fr-FR" dirty="0" err="1"/>
+              <a:t>View</a:t>
+            </a:r>
+            <a:endParaRPr lang="fr-FR" dirty="0"/>
+          </a:p>
+          <a:p>
+            <a:pPr lvl="1"/>
+            <a:r>
+              <a:rPr lang="fr-FR" dirty="0"/>
+              <a:t>Controller</a:t>
+            </a:r>
+          </a:p>
+          <a:p>
+            <a:pPr lvl="1"/>
+            <a:endParaRPr lang="fr-FR" dirty="0"/>
+          </a:p>
+          <a:p>
+            <a:r>
+              <a:rPr lang="fr-FR" dirty="0"/>
+              <a:t>Architecture populaire et rapide à prendre en mail</a:t>
+            </a:r>
+          </a:p>
+        </p:txBody>
+      </p:sp>
+    </p:spTree>
+    <p:extLst>
+      <p:ext uri="{BB962C8B-B14F-4D97-AF65-F5344CB8AC3E}">
+        <p14:creationId xmlns:p14="http://schemas.microsoft.com/office/powerpoint/2010/main" val="1496724827"/>
+      </p:ext>
+    </p:extLst>
+  </p:cSld>
+  <p:clrMapOvr>
+    <a:masterClrMapping/>
+  </p:clrMapOvr>
+</p:sld>
+</file>
+
+<file path=ppt/slides/slide5.xml><?xml version="1.0" encoding="utf-8"?>
+<p:sld xmlns:a="http://schemas.openxmlformats.org/drawingml/2006/main" xmlns:r="http://schemas.openxmlformats.org/officeDocument/2006/relationships" xmlns:p="http://schemas.openxmlformats.org/presentationml/2006/main">
+  <p:cSld>
+    <p:spTree>
+      <p:nvGrpSpPr>
+        <p:cNvPr id="1" name=""/>
+        <p:cNvGrpSpPr/>
+        <p:nvPr/>
+      </p:nvGrpSpPr>
+      <p:grpSpPr>
+        <a:xfrm>
+          <a:off x="0" y="0"/>
+          <a:ext cx="0" cy="0"/>
+          <a:chOff x="0" y="0"/>
+          <a:chExt cx="0" cy="0"/>
+        </a:xfrm>
+      </p:grpSpPr>
+      <p:sp>
+        <p:nvSpPr>
+          <p:cNvPr id="2" name="Titre 1">
+            <a:extLst>
+              <a:ext uri="{FF2B5EF4-FFF2-40B4-BE49-F238E27FC236}">
+                <a16:creationId xmlns:a16="http://schemas.microsoft.com/office/drawing/2014/main" id="{DBAFFEDE-4760-4DD0-94A2-C2A60A431A36}"/>
+              </a:ext>
+            </a:extLst>
+          </p:cNvPr>
+          <p:cNvSpPr>
+            <a:spLocks noGrp="1"/>
+          </p:cNvSpPr>
+          <p:nvPr>
+            <p:ph type="title"/>
+          </p:nvPr>
+        </p:nvSpPr>
+        <p:spPr/>
+        <p:txBody>
+          <a:bodyPr/>
+          <a:lstStyle/>
+          <a:p>
+            <a:pPr algn="ctr"/>
+            <a:r>
+              <a:rPr lang="fr-FR" dirty="0"/>
+              <a:t>Liste des tâches à réaliser</a:t>
+            </a:r>
+          </a:p>
+        </p:txBody>
+      </p:sp>
+      <p:sp>
+        <p:nvSpPr>
+          <p:cNvPr id="3" name="Espace réservé du contenu 2">
+            <a:extLst>
+              <a:ext uri="{FF2B5EF4-FFF2-40B4-BE49-F238E27FC236}">
+                <a16:creationId xmlns:a16="http://schemas.microsoft.com/office/drawing/2014/main" id="{97480A3A-DB12-478A-8DCF-7BBD7557426E}"/>
+              </a:ext>
+            </a:extLst>
+          </p:cNvPr>
+          <p:cNvSpPr>
+            <a:spLocks noGrp="1"/>
+          </p:cNvSpPr>
+          <p:nvPr>
+            <p:ph idx="1"/>
+          </p:nvPr>
+        </p:nvSpPr>
+        <p:spPr>
+          <a:xfrm>
+            <a:off x="1806498" y="1405054"/>
+            <a:ext cx="9698114" cy="5084956"/>
+          </a:xfrm>
+        </p:spPr>
+        <p:txBody>
+          <a:bodyPr/>
+          <a:lstStyle/>
+          <a:p>
+            <a:r>
+              <a:rPr lang="fr-FR" dirty="0"/>
+              <a:t>Analyse des besoins en fonctions des demandes</a:t>
+            </a:r>
+          </a:p>
+          <a:p>
+            <a:r>
+              <a:rPr lang="fr-FR" dirty="0"/>
+              <a:t>Séparation et répartitions des tâches </a:t>
+            </a:r>
+          </a:p>
+          <a:p>
+            <a:r>
+              <a:rPr lang="fr-FR" dirty="0"/>
+              <a:t>Création de la base de données adaptée</a:t>
+            </a:r>
+          </a:p>
+          <a:p>
+            <a:r>
+              <a:rPr lang="fr-FR" dirty="0"/>
+              <a:t>Installation de GitHub</a:t>
+            </a:r>
+          </a:p>
+          <a:p>
+            <a:pPr lvl="1"/>
+            <a:r>
+              <a:rPr lang="fr-FR" dirty="0"/>
+              <a:t>Premier Commit avec la BDD et la première version de l’architecture</a:t>
+            </a:r>
+          </a:p>
+          <a:p>
+            <a:pPr lvl="1"/>
+            <a:r>
+              <a:rPr lang="fr-FR" dirty="0"/>
+              <a:t>Création du repository local dans chacun des PC des contributeurs</a:t>
+            </a:r>
+          </a:p>
+          <a:p>
+            <a:pPr indent="-285750"/>
+            <a:r>
+              <a:rPr lang="fr-FR" dirty="0"/>
+              <a:t>Création de la documentation qui sera mise à jour en même temps que les </a:t>
+            </a:r>
+            <a:r>
+              <a:rPr lang="fr-FR" dirty="0" err="1"/>
+              <a:t>modifs</a:t>
+            </a:r>
+            <a:endParaRPr lang="fr-FR" dirty="0"/>
+          </a:p>
+          <a:p>
+            <a:r>
+              <a:rPr lang="fr-FR" dirty="0"/>
+              <a:t>Création des premières pages (accueil, connexion, inscription, administration) accessibles selon le niveau utilisateurs (user or Admin)</a:t>
+            </a:r>
+          </a:p>
+          <a:p>
+            <a:r>
+              <a:rPr lang="fr-FR" dirty="0"/>
+              <a:t>Création des fonctionnalités demandés (réservation, attribution des places </a:t>
+            </a:r>
+            <a:r>
+              <a:rPr lang="fr-FR" dirty="0" err="1"/>
+              <a:t>etc</a:t>
+            </a:r>
+            <a:r>
+              <a:rPr lang="fr-FR" dirty="0"/>
+              <a:t>,)</a:t>
+            </a:r>
+          </a:p>
+          <a:p>
+            <a:r>
+              <a:rPr lang="fr-FR" dirty="0"/>
+              <a:t>Création du </a:t>
+            </a:r>
+            <a:r>
+              <a:rPr lang="fr-FR" dirty="0" err="1"/>
+              <a:t>powerpoint</a:t>
+            </a:r>
+            <a:endParaRPr lang="fr-FR" dirty="0"/>
+          </a:p>
+          <a:p>
+            <a:pPr marL="0" indent="0">
+              <a:buNone/>
+            </a:pPr>
+            <a:r>
+              <a:rPr lang="fr-FR" dirty="0"/>
+              <a:t>(Plus de détails dans la documentation sur </a:t>
+            </a:r>
+            <a:r>
+              <a:rPr lang="fr-FR" dirty="0" err="1"/>
+              <a:t>word</a:t>
+            </a:r>
+            <a:r>
+              <a:rPr lang="fr-FR" dirty="0"/>
+              <a:t> présent dans GitHub)</a:t>
+            </a:r>
+          </a:p>
+          <a:p>
+            <a:pPr marL="0" indent="0">
+              <a:buNone/>
+            </a:pPr>
+            <a:endParaRPr lang="fr-FR" dirty="0"/>
+          </a:p>
+          <a:p>
+            <a:endParaRPr lang="fr-FR" dirty="0"/>
+          </a:p>
+        </p:txBody>
+      </p:sp>
+    </p:spTree>
+    <p:extLst>
+      <p:ext uri="{BB962C8B-B14F-4D97-AF65-F5344CB8AC3E}">
+        <p14:creationId xmlns:p14="http://schemas.microsoft.com/office/powerpoint/2010/main" val="2247788577"/>
+      </p:ext>
+    </p:extLst>
+  </p:cSld>
+  <p:clrMapOvr>
+    <a:masterClrMapping/>
+  </p:clrMapOvr>
+</p:sld>
+</file>
+
+<file path=ppt/slides/slide6.xml><?xml version="1.0" encoding="utf-8"?>
+<p:sld xmlns:a="http://schemas.openxmlformats.org/drawingml/2006/main" xmlns:r="http://schemas.openxmlformats.org/officeDocument/2006/relationships" xmlns:p="http://schemas.openxmlformats.org/presentationml/2006/main">
+  <p:cSld>
+    <p:spTree>
+      <p:nvGrpSpPr>
+        <p:cNvPr id="1" name=""/>
+        <p:cNvGrpSpPr/>
+        <p:nvPr/>
+      </p:nvGrpSpPr>
+      <p:grpSpPr>
+        <a:xfrm>
+          <a:off x="0" y="0"/>
+          <a:ext cx="0" cy="0"/>
+          <a:chOff x="0" y="0"/>
+          <a:chExt cx="0" cy="0"/>
+        </a:xfrm>
+      </p:grpSpPr>
+      <p:sp>
+        <p:nvSpPr>
+          <p:cNvPr id="2" name="Titre 1">
+            <a:extLst>
+              <a:ext uri="{FF2B5EF4-FFF2-40B4-BE49-F238E27FC236}">
+                <a16:creationId xmlns:a16="http://schemas.microsoft.com/office/drawing/2014/main" id="{3CE54146-C74F-42E4-A87F-B1BA0F15A81B}"/>
+              </a:ext>
+            </a:extLst>
+          </p:cNvPr>
+          <p:cNvSpPr>
+            <a:spLocks noGrp="1"/>
+          </p:cNvSpPr>
+          <p:nvPr>
+            <p:ph type="title"/>
+          </p:nvPr>
+        </p:nvSpPr>
+        <p:spPr/>
+        <p:txBody>
+          <a:bodyPr/>
+          <a:lstStyle/>
+          <a:p>
+            <a:pPr algn="ctr"/>
+            <a:r>
+              <a:rPr lang="fr-FR" dirty="0"/>
+              <a:t>Fonctionnalités</a:t>
+            </a:r>
+          </a:p>
+        </p:txBody>
+      </p:sp>
+      <p:sp>
+        <p:nvSpPr>
+          <p:cNvPr id="3" name="Espace réservé du contenu 2">
+            <a:extLst>
+              <a:ext uri="{FF2B5EF4-FFF2-40B4-BE49-F238E27FC236}">
+                <a16:creationId xmlns:a16="http://schemas.microsoft.com/office/drawing/2014/main" id="{3956B39D-D1C8-4057-8682-11288F94DA74}"/>
+              </a:ext>
+            </a:extLst>
+          </p:cNvPr>
+          <p:cNvSpPr>
+            <a:spLocks noGrp="1"/>
+          </p:cNvSpPr>
+          <p:nvPr>
+            <p:ph idx="1"/>
+          </p:nvPr>
+        </p:nvSpPr>
+        <p:spPr/>
+        <p:txBody>
+          <a:bodyPr/>
+          <a:lstStyle/>
+          <a:p>
+            <a:r>
+              <a:rPr lang="fr-FR" dirty="0"/>
+              <a:t>Connexion</a:t>
+            </a:r>
+          </a:p>
+          <a:p>
+            <a:r>
+              <a:rPr lang="fr-FR" dirty="0"/>
+              <a:t>Inscription</a:t>
+            </a:r>
+          </a:p>
+          <a:p>
+            <a:r>
+              <a:rPr lang="fr-FR" dirty="0"/>
+              <a:t>Réservation</a:t>
+            </a:r>
+          </a:p>
+          <a:p>
+            <a:r>
+              <a:rPr lang="fr-FR" dirty="0"/>
+              <a:t>Modification infos personnelles</a:t>
+            </a:r>
+          </a:p>
+          <a:p>
+            <a:r>
+              <a:rPr lang="fr-FR" dirty="0"/>
+              <a:t>Admin :</a:t>
+            </a:r>
+          </a:p>
+          <a:p>
+            <a:pPr lvl="2"/>
+            <a:r>
+              <a:rPr lang="fr-FR" dirty="0"/>
+              <a:t>Acceptation des demandes d’inscription</a:t>
+            </a:r>
+          </a:p>
+          <a:p>
+            <a:pPr lvl="2"/>
+            <a:r>
+              <a:rPr lang="fr-FR" dirty="0"/>
+              <a:t>Acceptation des demandes de réservation</a:t>
+            </a:r>
+          </a:p>
+          <a:p>
+            <a:endParaRPr lang="fr-FR" dirty="0"/>
+          </a:p>
+        </p:txBody>
+      </p:sp>
+    </p:spTree>
+    <p:extLst>
+      <p:ext uri="{BB962C8B-B14F-4D97-AF65-F5344CB8AC3E}">
+        <p14:creationId xmlns:p14="http://schemas.microsoft.com/office/powerpoint/2010/main" val="3947950285"/>
       </p:ext>
     </p:extLst>
   </p:cSld>

</xml_diff>

<commit_message>
pattern on html entries
</commit_message>
<xml_diff>
--- a/web/PPE Projet Parking.pptx
+++ b/web/PPE Projet Parking.pptx
@@ -309,7 +309,7 @@
           <a:p>
             <a:fld id="{810E94BB-6A8F-4597-8B7A-8F7F2E664C76}" type="datetimeFigureOut">
               <a:rPr lang="fr-FR" smtClean="0"/>
-              <a:t>29/10/2017</a:t>
+              <a:t>03/11/2017</a:t>
             </a:fld>
             <a:endParaRPr lang="fr-FR"/>
           </a:p>
@@ -647,7 +647,7 @@
           <a:p>
             <a:fld id="{810E94BB-6A8F-4597-8B7A-8F7F2E664C76}" type="datetimeFigureOut">
               <a:rPr lang="fr-FR" smtClean="0"/>
-              <a:t>29/10/2017</a:t>
+              <a:t>03/11/2017</a:t>
             </a:fld>
             <a:endParaRPr lang="fr-FR"/>
           </a:p>
@@ -1048,7 +1048,7 @@
           <a:p>
             <a:fld id="{810E94BB-6A8F-4597-8B7A-8F7F2E664C76}" type="datetimeFigureOut">
               <a:rPr lang="fr-FR" smtClean="0"/>
-              <a:t>29/10/2017</a:t>
+              <a:t>03/11/2017</a:t>
             </a:fld>
             <a:endParaRPr lang="fr-FR"/>
           </a:p>
@@ -1384,7 +1384,7 @@
           <a:p>
             <a:fld id="{810E94BB-6A8F-4597-8B7A-8F7F2E664C76}" type="datetimeFigureOut">
               <a:rPr lang="fr-FR" smtClean="0"/>
-              <a:t>29/10/2017</a:t>
+              <a:t>03/11/2017</a:t>
             </a:fld>
             <a:endParaRPr lang="fr-FR"/>
           </a:p>
@@ -1704,7 +1704,7 @@
           <a:p>
             <a:fld id="{810E94BB-6A8F-4597-8B7A-8F7F2E664C76}" type="datetimeFigureOut">
               <a:rPr lang="fr-FR" smtClean="0"/>
-              <a:t>29/10/2017</a:t>
+              <a:t>03/11/2017</a:t>
             </a:fld>
             <a:endParaRPr lang="fr-FR"/>
           </a:p>
@@ -2100,7 +2100,7 @@
           <a:p>
             <a:fld id="{810E94BB-6A8F-4597-8B7A-8F7F2E664C76}" type="datetimeFigureOut">
               <a:rPr lang="fr-FR" smtClean="0"/>
-              <a:t>29/10/2017</a:t>
+              <a:t>03/11/2017</a:t>
             </a:fld>
             <a:endParaRPr lang="fr-FR"/>
           </a:p>
@@ -2357,7 +2357,7 @@
           <a:p>
             <a:fld id="{810E94BB-6A8F-4597-8B7A-8F7F2E664C76}" type="datetimeFigureOut">
               <a:rPr lang="fr-FR" smtClean="0"/>
-              <a:t>29/10/2017</a:t>
+              <a:t>03/11/2017</a:t>
             </a:fld>
             <a:endParaRPr lang="fr-FR"/>
           </a:p>
@@ -2619,7 +2619,7 @@
           <a:p>
             <a:fld id="{810E94BB-6A8F-4597-8B7A-8F7F2E664C76}" type="datetimeFigureOut">
               <a:rPr lang="fr-FR" smtClean="0"/>
-              <a:t>29/10/2017</a:t>
+              <a:t>03/11/2017</a:t>
             </a:fld>
             <a:endParaRPr lang="fr-FR"/>
           </a:p>
@@ -2881,7 +2881,7 @@
           <a:p>
             <a:fld id="{810E94BB-6A8F-4597-8B7A-8F7F2E664C76}" type="datetimeFigureOut">
               <a:rPr lang="fr-FR" smtClean="0"/>
-              <a:t>29/10/2017</a:t>
+              <a:t>03/11/2017</a:t>
             </a:fld>
             <a:endParaRPr lang="fr-FR"/>
           </a:p>
@@ -3210,7 +3210,7 @@
           <a:p>
             <a:fld id="{810E94BB-6A8F-4597-8B7A-8F7F2E664C76}" type="datetimeFigureOut">
               <a:rPr lang="fr-FR" smtClean="0"/>
-              <a:t>29/10/2017</a:t>
+              <a:t>03/11/2017</a:t>
             </a:fld>
             <a:endParaRPr lang="fr-FR"/>
           </a:p>
@@ -3533,7 +3533,7 @@
           <a:p>
             <a:fld id="{810E94BB-6A8F-4597-8B7A-8F7F2E664C76}" type="datetimeFigureOut">
               <a:rPr lang="fr-FR" smtClean="0"/>
-              <a:t>29/10/2017</a:t>
+              <a:t>03/11/2017</a:t>
             </a:fld>
             <a:endParaRPr lang="fr-FR"/>
           </a:p>
@@ -3990,7 +3990,7 @@
           <a:p>
             <a:fld id="{810E94BB-6A8F-4597-8B7A-8F7F2E664C76}" type="datetimeFigureOut">
               <a:rPr lang="fr-FR" smtClean="0"/>
-              <a:t>29/10/2017</a:t>
+              <a:t>03/11/2017</a:t>
             </a:fld>
             <a:endParaRPr lang="fr-FR"/>
           </a:p>
@@ -4195,7 +4195,7 @@
           <a:p>
             <a:fld id="{810E94BB-6A8F-4597-8B7A-8F7F2E664C76}" type="datetimeFigureOut">
               <a:rPr lang="fr-FR" smtClean="0"/>
-              <a:t>29/10/2017</a:t>
+              <a:t>03/11/2017</a:t>
             </a:fld>
             <a:endParaRPr lang="fr-FR"/>
           </a:p>
@@ -4372,7 +4372,7 @@
           <a:p>
             <a:fld id="{810E94BB-6A8F-4597-8B7A-8F7F2E664C76}" type="datetimeFigureOut">
               <a:rPr lang="fr-FR" smtClean="0"/>
-              <a:t>29/10/2017</a:t>
+              <a:t>03/11/2017</a:t>
             </a:fld>
             <a:endParaRPr lang="fr-FR"/>
           </a:p>
@@ -4705,7 +4705,7 @@
           <a:p>
             <a:fld id="{810E94BB-6A8F-4597-8B7A-8F7F2E664C76}" type="datetimeFigureOut">
               <a:rPr lang="fr-FR" smtClean="0"/>
-              <a:t>29/10/2017</a:t>
+              <a:t>03/11/2017</a:t>
             </a:fld>
             <a:endParaRPr lang="fr-FR"/>
           </a:p>
@@ -5050,7 +5050,7 @@
           <a:p>
             <a:fld id="{810E94BB-6A8F-4597-8B7A-8F7F2E664C76}" type="datetimeFigureOut">
               <a:rPr lang="fr-FR" smtClean="0"/>
-              <a:t>29/10/2017</a:t>
+              <a:t>03/11/2017</a:t>
             </a:fld>
             <a:endParaRPr lang="fr-FR"/>
           </a:p>
@@ -7167,7 +7167,7 @@
           <a:p>
             <a:fld id="{810E94BB-6A8F-4597-8B7A-8F7F2E664C76}" type="datetimeFigureOut">
               <a:rPr lang="fr-FR" smtClean="0"/>
-              <a:t>29/10/2017</a:t>
+              <a:t>03/11/2017</a:t>
             </a:fld>
             <a:endParaRPr lang="fr-FR"/>
           </a:p>
@@ -8126,7 +8126,7 @@
           <a:p>
             <a:r>
               <a:rPr lang="fr-FR" dirty="0"/>
-              <a:t>Architecture populaire et rapide à prendre en mail</a:t>
+              <a:t>Architecture populaire et rapide à prendre en main</a:t>
             </a:r>
           </a:p>
         </p:txBody>
@@ -8300,23 +8300,6 @@
             <a:pPr marL="0" indent="0">
               <a:buNone/>
             </a:pPr>
-            <a:r>
-              <a:rPr lang="fr-FR" dirty="0"/>
-              <a:t>(Plus de détails dans la documentation sur </a:t>
-            </a:r>
-            <a:r>
-              <a:rPr lang="fr-FR" dirty="0" err="1"/>
-              <a:t>word</a:t>
-            </a:r>
-            <a:r>
-              <a:rPr lang="fr-FR" dirty="0"/>
-              <a:t> présent dans GitHub)</a:t>
-            </a:r>
-          </a:p>
-          <a:p>
-            <a:pPr marL="0" indent="0">
-              <a:buNone/>
-            </a:pPr>
             <a:endParaRPr lang="fr-FR" dirty="0"/>
           </a:p>
           <a:p>
@@ -8437,17 +8420,20 @@
             <a:pPr lvl="2"/>
             <a:r>
               <a:rPr lang="fr-FR" dirty="0"/>
-              <a:t>Acceptation des demandes d’inscription</a:t>
+              <a:t>Acceptation/refus des demandes d’inscription</a:t>
             </a:r>
           </a:p>
           <a:p>
             <a:pPr lvl="2"/>
             <a:r>
               <a:rPr lang="fr-FR" dirty="0"/>
-              <a:t>Acceptation des demandes de réservation</a:t>
-            </a:r>
-          </a:p>
-          <a:p>
+              <a:t>Acceptation/refus des demandes de réservation</a:t>
+            </a:r>
+          </a:p>
+          <a:p>
+            <a:pPr marL="0" indent="0">
+              <a:buNone/>
+            </a:pPr>
             <a:endParaRPr lang="fr-FR" dirty="0"/>
           </a:p>
         </p:txBody>

</xml_diff>

<commit_message>
Mise à jour powerpoint
</commit_message>
<xml_diff>
--- a/web/PPE Projet Parking.pptx
+++ b/web/PPE Projet Parking.pptx
@@ -9,8 +9,12 @@
     <p:sldId id="257" r:id="rId3"/>
     <p:sldId id="258" r:id="rId4"/>
     <p:sldId id="259" r:id="rId5"/>
-    <p:sldId id="260" r:id="rId6"/>
-    <p:sldId id="261" r:id="rId7"/>
+    <p:sldId id="262" r:id="rId6"/>
+    <p:sldId id="263" r:id="rId7"/>
+    <p:sldId id="264" r:id="rId8"/>
+    <p:sldId id="265" r:id="rId9"/>
+    <p:sldId id="260" r:id="rId10"/>
+    <p:sldId id="261" r:id="rId11"/>
   </p:sldIdLst>
   <p:sldSz cx="12192000" cy="6858000"/>
   <p:notesSz cx="6858000" cy="9144000"/>
@@ -7746,7 +7750,7 @@
           <a:p>
             <a:r>
               <a:rPr lang="fr-FR" dirty="0"/>
-              <a:t>BY</a:t>
+              <a:t>par</a:t>
             </a:r>
           </a:p>
           <a:p>
@@ -7773,6 +7777,137 @@
     <p:extLst>
       <p:ext uri="{BB962C8B-B14F-4D97-AF65-F5344CB8AC3E}">
         <p14:creationId xmlns:p14="http://schemas.microsoft.com/office/powerpoint/2010/main" val="100708301"/>
+      </p:ext>
+    </p:extLst>
+  </p:cSld>
+  <p:clrMapOvr>
+    <a:masterClrMapping/>
+  </p:clrMapOvr>
+</p:sld>
+</file>
+
+<file path=ppt/slides/slide10.xml><?xml version="1.0" encoding="utf-8"?>
+<p:sld xmlns:a="http://schemas.openxmlformats.org/drawingml/2006/main" xmlns:r="http://schemas.openxmlformats.org/officeDocument/2006/relationships" xmlns:p="http://schemas.openxmlformats.org/presentationml/2006/main">
+  <p:cSld>
+    <p:spTree>
+      <p:nvGrpSpPr>
+        <p:cNvPr id="1" name=""/>
+        <p:cNvGrpSpPr/>
+        <p:nvPr/>
+      </p:nvGrpSpPr>
+      <p:grpSpPr>
+        <a:xfrm>
+          <a:off x="0" y="0"/>
+          <a:ext cx="0" cy="0"/>
+          <a:chOff x="0" y="0"/>
+          <a:chExt cx="0" cy="0"/>
+        </a:xfrm>
+      </p:grpSpPr>
+      <p:sp>
+        <p:nvSpPr>
+          <p:cNvPr id="2" name="Titre 1">
+            <a:extLst>
+              <a:ext uri="{FF2B5EF4-FFF2-40B4-BE49-F238E27FC236}">
+                <a16:creationId xmlns:a16="http://schemas.microsoft.com/office/drawing/2014/main" id="{3CE54146-C74F-42E4-A87F-B1BA0F15A81B}"/>
+              </a:ext>
+            </a:extLst>
+          </p:cNvPr>
+          <p:cNvSpPr>
+            <a:spLocks noGrp="1"/>
+          </p:cNvSpPr>
+          <p:nvPr>
+            <p:ph type="title"/>
+          </p:nvPr>
+        </p:nvSpPr>
+        <p:spPr/>
+        <p:txBody>
+          <a:bodyPr/>
+          <a:lstStyle/>
+          <a:p>
+            <a:pPr algn="ctr"/>
+            <a:r>
+              <a:rPr lang="fr-FR" dirty="0"/>
+              <a:t>Fonctionnalités</a:t>
+            </a:r>
+          </a:p>
+        </p:txBody>
+      </p:sp>
+      <p:sp>
+        <p:nvSpPr>
+          <p:cNvPr id="3" name="Espace réservé du contenu 2">
+            <a:extLst>
+              <a:ext uri="{FF2B5EF4-FFF2-40B4-BE49-F238E27FC236}">
+                <a16:creationId xmlns:a16="http://schemas.microsoft.com/office/drawing/2014/main" id="{3956B39D-D1C8-4057-8682-11288F94DA74}"/>
+              </a:ext>
+            </a:extLst>
+          </p:cNvPr>
+          <p:cNvSpPr>
+            <a:spLocks noGrp="1"/>
+          </p:cNvSpPr>
+          <p:nvPr>
+            <p:ph idx="1"/>
+          </p:nvPr>
+        </p:nvSpPr>
+        <p:spPr/>
+        <p:txBody>
+          <a:bodyPr/>
+          <a:lstStyle/>
+          <a:p>
+            <a:r>
+              <a:rPr lang="fr-FR" dirty="0"/>
+              <a:t>Connexion</a:t>
+            </a:r>
+          </a:p>
+          <a:p>
+            <a:r>
+              <a:rPr lang="fr-FR" dirty="0"/>
+              <a:t>Inscription</a:t>
+            </a:r>
+          </a:p>
+          <a:p>
+            <a:r>
+              <a:rPr lang="fr-FR" dirty="0"/>
+              <a:t>Réservation</a:t>
+            </a:r>
+          </a:p>
+          <a:p>
+            <a:r>
+              <a:rPr lang="fr-FR" dirty="0"/>
+              <a:t>Modification infos personnelles</a:t>
+            </a:r>
+          </a:p>
+          <a:p>
+            <a:r>
+              <a:rPr lang="fr-FR" dirty="0"/>
+              <a:t>Admin :</a:t>
+            </a:r>
+          </a:p>
+          <a:p>
+            <a:pPr lvl="2"/>
+            <a:r>
+              <a:rPr lang="fr-FR" dirty="0"/>
+              <a:t>Acceptation/refus des demandes d’inscription</a:t>
+            </a:r>
+          </a:p>
+          <a:p>
+            <a:pPr lvl="2"/>
+            <a:r>
+              <a:rPr lang="fr-FR" dirty="0"/>
+              <a:t>Acceptation/refus des demandes de réservation</a:t>
+            </a:r>
+          </a:p>
+          <a:p>
+            <a:pPr marL="0" indent="0">
+              <a:buNone/>
+            </a:pPr>
+            <a:endParaRPr lang="fr-FR" dirty="0"/>
+          </a:p>
+        </p:txBody>
+      </p:sp>
+    </p:spTree>
+    <p:extLst>
+      <p:ext uri="{BB962C8B-B14F-4D97-AF65-F5344CB8AC3E}">
+        <p14:creationId xmlns:p14="http://schemas.microsoft.com/office/powerpoint/2010/main" val="3947950285"/>
       </p:ext>
     </p:extLst>
   </p:cSld>
@@ -7846,7 +7981,9 @@
         </p:nvSpPr>
         <p:spPr/>
         <p:txBody>
-          <a:bodyPr/>
+          <a:bodyPr>
+            <a:normAutofit fontScale="70000" lnSpcReduction="20000"/>
+          </a:bodyPr>
           <a:lstStyle/>
           <a:p>
             <a:r>
@@ -7861,6 +7998,33 @@
             <a:r>
               <a:rPr lang="fr-FR" dirty="0"/>
               <a:t>Architecture</a:t>
+            </a:r>
+          </a:p>
+          <a:p>
+            <a:endParaRPr lang="fr-FR" dirty="0"/>
+          </a:p>
+          <a:p>
+            <a:r>
+              <a:rPr lang="fr-FR" dirty="0"/>
+              <a:t>Arborescence</a:t>
+            </a:r>
+          </a:p>
+          <a:p>
+            <a:endParaRPr lang="fr-FR" dirty="0"/>
+          </a:p>
+          <a:p>
+            <a:r>
+              <a:rPr lang="fr-FR" dirty="0"/>
+              <a:t>Base de donnée</a:t>
+            </a:r>
+          </a:p>
+          <a:p>
+            <a:endParaRPr lang="fr-FR" dirty="0"/>
+          </a:p>
+          <a:p>
+            <a:r>
+              <a:rPr lang="fr-FR" dirty="0"/>
+              <a:t>Liste des variables essentielles</a:t>
             </a:r>
           </a:p>
           <a:p>
@@ -8166,7 +8330,7 @@
           <p:cNvPr id="2" name="Titre 1">
             <a:extLst>
               <a:ext uri="{FF2B5EF4-FFF2-40B4-BE49-F238E27FC236}">
-                <a16:creationId xmlns:a16="http://schemas.microsoft.com/office/drawing/2014/main" id="{DBAFFEDE-4760-4DD0-94A2-C2A60A431A36}"/>
+                <a16:creationId xmlns:a16="http://schemas.microsoft.com/office/drawing/2014/main" id="{0C2E4FAA-89FB-42B2-98CA-49B7ECDFBC66}"/>
               </a:ext>
             </a:extLst>
           </p:cNvPr>
@@ -8185,132 +8349,50 @@
             <a:pPr algn="ctr"/>
             <a:r>
               <a:rPr lang="fr-FR" dirty="0"/>
-              <a:t>Liste des tâches à réaliser</a:t>
-            </a:r>
-          </a:p>
-        </p:txBody>
-      </p:sp>
-      <p:sp>
-        <p:nvSpPr>
-          <p:cNvPr id="3" name="Espace réservé du contenu 2">
+              <a:t>Arborescence</a:t>
+            </a:r>
+          </a:p>
+        </p:txBody>
+      </p:sp>
+      <p:pic>
+        <p:nvPicPr>
+          <p:cNvPr id="5" name="Espace réservé du contenu 4">
             <a:extLst>
               <a:ext uri="{FF2B5EF4-FFF2-40B4-BE49-F238E27FC236}">
-                <a16:creationId xmlns:a16="http://schemas.microsoft.com/office/drawing/2014/main" id="{97480A3A-DB12-478A-8DCF-7BBD7557426E}"/>
+                <a16:creationId xmlns:a16="http://schemas.microsoft.com/office/drawing/2014/main" id="{4DAFACC9-59DB-488A-88EB-A17AD96216A5}"/>
               </a:ext>
             </a:extLst>
           </p:cNvPr>
-          <p:cNvSpPr>
-            <a:spLocks noGrp="1"/>
-          </p:cNvSpPr>
+          <p:cNvPicPr>
+            <a:picLocks noGrp="1" noChangeAspect="1"/>
+          </p:cNvPicPr>
           <p:nvPr>
             <p:ph idx="1"/>
           </p:nvPr>
-        </p:nvSpPr>
+        </p:nvPicPr>
+        <p:blipFill>
+          <a:blip r:embed="rId2">
+            <a:extLst>
+              <a:ext uri="{28A0092B-C50C-407E-A947-70E740481C1C}">
+                <a14:useLocalDpi xmlns:a14="http://schemas.microsoft.com/office/drawing/2010/main" val="0"/>
+              </a:ext>
+            </a:extLst>
+          </a:blip>
+          <a:stretch>
+            <a:fillRect/>
+          </a:stretch>
+        </p:blipFill>
         <p:spPr>
           <a:xfrm>
-            <a:off x="1806498" y="1405054"/>
-            <a:ext cx="9698114" cy="5084956"/>
+            <a:off x="3528098" y="2133600"/>
+            <a:ext cx="7037630" cy="3778250"/>
           </a:xfrm>
         </p:spPr>
-        <p:txBody>
-          <a:bodyPr/>
-          <a:lstStyle/>
-          <a:p>
-            <a:r>
-              <a:rPr lang="fr-FR" dirty="0"/>
-              <a:t>Analyse des besoins en fonctions des demandes</a:t>
-            </a:r>
-          </a:p>
-          <a:p>
-            <a:r>
-              <a:rPr lang="fr-FR" dirty="0"/>
-              <a:t>Séparation et répartitions des tâches </a:t>
-            </a:r>
-          </a:p>
-          <a:p>
-            <a:r>
-              <a:rPr lang="fr-FR" dirty="0"/>
-              <a:t>Création de la base de données adaptée</a:t>
-            </a:r>
-          </a:p>
-          <a:p>
-            <a:r>
-              <a:rPr lang="fr-FR" dirty="0"/>
-              <a:t>Installation de GitHub</a:t>
-            </a:r>
-          </a:p>
-          <a:p>
-            <a:pPr lvl="1"/>
-            <a:r>
-              <a:rPr lang="fr-FR" dirty="0"/>
-              <a:t>Premier Commit avec la BDD et la première version de l’architecture</a:t>
-            </a:r>
-          </a:p>
-          <a:p>
-            <a:pPr lvl="1"/>
-            <a:r>
-              <a:rPr lang="fr-FR" dirty="0"/>
-              <a:t>Création du repository local dans chacun des PC des contributeurs</a:t>
-            </a:r>
-          </a:p>
-          <a:p>
-            <a:pPr indent="-285750"/>
-            <a:r>
-              <a:rPr lang="fr-FR" dirty="0"/>
-              <a:t>Création de la documentation qui sera mise à jour en même temps que les </a:t>
-            </a:r>
-            <a:r>
-              <a:rPr lang="fr-FR" dirty="0" err="1"/>
-              <a:t>modifs</a:t>
-            </a:r>
-            <a:endParaRPr lang="fr-FR" dirty="0"/>
-          </a:p>
-          <a:p>
-            <a:r>
-              <a:rPr lang="fr-FR" dirty="0"/>
-              <a:t>Création des premières pages (accueil, connexion, inscription, administration) accessibles selon le niveau utilisateurs (user or Admin)</a:t>
-            </a:r>
-          </a:p>
-          <a:p>
-            <a:r>
-              <a:rPr lang="fr-FR" dirty="0"/>
-              <a:t>Création des fonctionnalités demandés (réservation, attribution des places </a:t>
-            </a:r>
-            <a:r>
-              <a:rPr lang="fr-FR" dirty="0" err="1"/>
-              <a:t>etc</a:t>
-            </a:r>
-            <a:r>
-              <a:rPr lang="fr-FR" dirty="0"/>
-              <a:t>,)</a:t>
-            </a:r>
-          </a:p>
-          <a:p>
-            <a:r>
-              <a:rPr lang="fr-FR" dirty="0"/>
-              <a:t>Création du </a:t>
-            </a:r>
-            <a:r>
-              <a:rPr lang="fr-FR" dirty="0" err="1"/>
-              <a:t>powerpoint</a:t>
-            </a:r>
-            <a:endParaRPr lang="fr-FR" dirty="0"/>
-          </a:p>
-          <a:p>
-            <a:pPr marL="0" indent="0">
-              <a:buNone/>
-            </a:pPr>
-            <a:endParaRPr lang="fr-FR" dirty="0"/>
-          </a:p>
-          <a:p>
-            <a:endParaRPr lang="fr-FR" dirty="0"/>
-          </a:p>
-        </p:txBody>
-      </p:sp>
+      </p:pic>
     </p:spTree>
     <p:extLst>
       <p:ext uri="{BB962C8B-B14F-4D97-AF65-F5344CB8AC3E}">
-        <p14:creationId xmlns:p14="http://schemas.microsoft.com/office/powerpoint/2010/main" val="2247788577"/>
+        <p14:creationId xmlns:p14="http://schemas.microsoft.com/office/powerpoint/2010/main" val="2522746728"/>
       </p:ext>
     </p:extLst>
   </p:cSld>
@@ -8342,7 +8424,7 @@
           <p:cNvPr id="2" name="Titre 1">
             <a:extLst>
               <a:ext uri="{FF2B5EF4-FFF2-40B4-BE49-F238E27FC236}">
-                <a16:creationId xmlns:a16="http://schemas.microsoft.com/office/drawing/2014/main" id="{3CE54146-C74F-42E4-A87F-B1BA0F15A81B}"/>
+                <a16:creationId xmlns:a16="http://schemas.microsoft.com/office/drawing/2014/main" id="{63544962-2D07-45C5-9322-E3354EB82BEB}"/>
               </a:ext>
             </a:extLst>
           </p:cNvPr>
@@ -8361,7 +8443,195 @@
             <a:pPr algn="ctr"/>
             <a:r>
               <a:rPr lang="fr-FR" dirty="0"/>
-              <a:t>Fonctionnalités</a:t>
+              <a:t>Base de donnée</a:t>
+            </a:r>
+          </a:p>
+        </p:txBody>
+      </p:sp>
+      <p:pic>
+        <p:nvPicPr>
+          <p:cNvPr id="5" name="Espace réservé du contenu 4">
+            <a:extLst>
+              <a:ext uri="{FF2B5EF4-FFF2-40B4-BE49-F238E27FC236}">
+                <a16:creationId xmlns:a16="http://schemas.microsoft.com/office/drawing/2014/main" id="{7B0FECA1-E52B-48FE-9F27-44B86325E3C2}"/>
+              </a:ext>
+            </a:extLst>
+          </p:cNvPr>
+          <p:cNvPicPr>
+            <a:picLocks noGrp="1" noChangeAspect="1"/>
+          </p:cNvPicPr>
+          <p:nvPr>
+            <p:ph idx="1"/>
+          </p:nvPr>
+        </p:nvPicPr>
+        <p:blipFill>
+          <a:blip r:embed="rId2">
+            <a:extLst>
+              <a:ext uri="{28A0092B-C50C-407E-A947-70E740481C1C}">
+                <a14:useLocalDpi xmlns:a14="http://schemas.microsoft.com/office/drawing/2010/main" val="0"/>
+              </a:ext>
+            </a:extLst>
+          </a:blip>
+          <a:stretch>
+            <a:fillRect/>
+          </a:stretch>
+        </p:blipFill>
+        <p:spPr>
+          <a:xfrm>
+            <a:off x="2589213" y="2250836"/>
+            <a:ext cx="8915400" cy="3543778"/>
+          </a:xfrm>
+        </p:spPr>
+      </p:pic>
+    </p:spTree>
+    <p:extLst>
+      <p:ext uri="{BB962C8B-B14F-4D97-AF65-F5344CB8AC3E}">
+        <p14:creationId xmlns:p14="http://schemas.microsoft.com/office/powerpoint/2010/main" val="2269444403"/>
+      </p:ext>
+    </p:extLst>
+  </p:cSld>
+  <p:clrMapOvr>
+    <a:masterClrMapping/>
+  </p:clrMapOvr>
+</p:sld>
+</file>
+
+<file path=ppt/slides/slide7.xml><?xml version="1.0" encoding="utf-8"?>
+<p:sld xmlns:a="http://schemas.openxmlformats.org/drawingml/2006/main" xmlns:r="http://schemas.openxmlformats.org/officeDocument/2006/relationships" xmlns:p="http://schemas.openxmlformats.org/presentationml/2006/main">
+  <p:cSld>
+    <p:spTree>
+      <p:nvGrpSpPr>
+        <p:cNvPr id="1" name=""/>
+        <p:cNvGrpSpPr/>
+        <p:nvPr/>
+      </p:nvGrpSpPr>
+      <p:grpSpPr>
+        <a:xfrm>
+          <a:off x="0" y="0"/>
+          <a:ext cx="0" cy="0"/>
+          <a:chOff x="0" y="0"/>
+          <a:chExt cx="0" cy="0"/>
+        </a:xfrm>
+      </p:grpSpPr>
+      <p:sp>
+        <p:nvSpPr>
+          <p:cNvPr id="2" name="Titre 1">
+            <a:extLst>
+              <a:ext uri="{FF2B5EF4-FFF2-40B4-BE49-F238E27FC236}">
+                <a16:creationId xmlns:a16="http://schemas.microsoft.com/office/drawing/2014/main" id="{079C0CD3-F745-4A9A-97DE-D8A30B93B521}"/>
+              </a:ext>
+            </a:extLst>
+          </p:cNvPr>
+          <p:cNvSpPr>
+            <a:spLocks noGrp="1"/>
+          </p:cNvSpPr>
+          <p:nvPr>
+            <p:ph type="title"/>
+          </p:nvPr>
+        </p:nvSpPr>
+        <p:spPr/>
+        <p:txBody>
+          <a:bodyPr/>
+          <a:lstStyle/>
+          <a:p>
+            <a:pPr algn="ctr"/>
+            <a:r>
+              <a:rPr lang="fr-FR" dirty="0"/>
+              <a:t>Base de donnée</a:t>
+            </a:r>
+          </a:p>
+        </p:txBody>
+      </p:sp>
+      <p:pic>
+        <p:nvPicPr>
+          <p:cNvPr id="5" name="Espace réservé du contenu 4">
+            <a:extLst>
+              <a:ext uri="{FF2B5EF4-FFF2-40B4-BE49-F238E27FC236}">
+                <a16:creationId xmlns:a16="http://schemas.microsoft.com/office/drawing/2014/main" id="{77343185-11BB-4ED0-BEC7-6E91202B5642}"/>
+              </a:ext>
+            </a:extLst>
+          </p:cNvPr>
+          <p:cNvPicPr>
+            <a:picLocks noGrp="1" noChangeAspect="1"/>
+          </p:cNvPicPr>
+          <p:nvPr>
+            <p:ph idx="1"/>
+          </p:nvPr>
+        </p:nvPicPr>
+        <p:blipFill>
+          <a:blip r:embed="rId2">
+            <a:extLst>
+              <a:ext uri="{28A0092B-C50C-407E-A947-70E740481C1C}">
+                <a14:useLocalDpi xmlns:a14="http://schemas.microsoft.com/office/drawing/2010/main" val="0"/>
+              </a:ext>
+            </a:extLst>
+          </a:blip>
+          <a:stretch>
+            <a:fillRect/>
+          </a:stretch>
+        </p:blipFill>
+        <p:spPr>
+          <a:xfrm>
+            <a:off x="3392848" y="2133600"/>
+            <a:ext cx="7308129" cy="3778250"/>
+          </a:xfrm>
+        </p:spPr>
+      </p:pic>
+    </p:spTree>
+    <p:extLst>
+      <p:ext uri="{BB962C8B-B14F-4D97-AF65-F5344CB8AC3E}">
+        <p14:creationId xmlns:p14="http://schemas.microsoft.com/office/powerpoint/2010/main" val="927985852"/>
+      </p:ext>
+    </p:extLst>
+  </p:cSld>
+  <p:clrMapOvr>
+    <a:masterClrMapping/>
+  </p:clrMapOvr>
+</p:sld>
+</file>
+
+<file path=ppt/slides/slide8.xml><?xml version="1.0" encoding="utf-8"?>
+<p:sld xmlns:a="http://schemas.openxmlformats.org/drawingml/2006/main" xmlns:r="http://schemas.openxmlformats.org/officeDocument/2006/relationships" xmlns:p="http://schemas.openxmlformats.org/presentationml/2006/main">
+  <p:cSld>
+    <p:spTree>
+      <p:nvGrpSpPr>
+        <p:cNvPr id="1" name=""/>
+        <p:cNvGrpSpPr/>
+        <p:nvPr/>
+      </p:nvGrpSpPr>
+      <p:grpSpPr>
+        <a:xfrm>
+          <a:off x="0" y="0"/>
+          <a:ext cx="0" cy="0"/>
+          <a:chOff x="0" y="0"/>
+          <a:chExt cx="0" cy="0"/>
+        </a:xfrm>
+      </p:grpSpPr>
+      <p:sp>
+        <p:nvSpPr>
+          <p:cNvPr id="2" name="Titre 1">
+            <a:extLst>
+              <a:ext uri="{FF2B5EF4-FFF2-40B4-BE49-F238E27FC236}">
+                <a16:creationId xmlns:a16="http://schemas.microsoft.com/office/drawing/2014/main" id="{544BD3B3-EF0D-437D-BFCA-19A233AFFBCC}"/>
+              </a:ext>
+            </a:extLst>
+          </p:cNvPr>
+          <p:cNvSpPr>
+            <a:spLocks noGrp="1"/>
+          </p:cNvSpPr>
+          <p:nvPr>
+            <p:ph type="title"/>
+          </p:nvPr>
+        </p:nvSpPr>
+        <p:spPr/>
+        <p:txBody>
+          <a:bodyPr/>
+          <a:lstStyle/>
+          <a:p>
+            <a:pPr algn="ctr"/>
+            <a:r>
+              <a:rPr lang="fr-FR" dirty="0"/>
+              <a:t>Variables essentielles</a:t>
             </a:r>
           </a:p>
         </p:txBody>
@@ -8371,7 +8641,7 @@
           <p:cNvPr id="3" name="Espace réservé du contenu 2">
             <a:extLst>
               <a:ext uri="{FF2B5EF4-FFF2-40B4-BE49-F238E27FC236}">
-                <a16:creationId xmlns:a16="http://schemas.microsoft.com/office/drawing/2014/main" id="{3956B39D-D1C8-4057-8682-11288F94DA74}"/>
+                <a16:creationId xmlns:a16="http://schemas.microsoft.com/office/drawing/2014/main" id="{34844C90-DE6F-4F08-A166-DFDBC20090D2}"/>
               </a:ext>
             </a:extLst>
           </p:cNvPr>
@@ -8384,56 +8654,103 @@
         </p:nvSpPr>
         <p:spPr/>
         <p:txBody>
-          <a:bodyPr/>
+          <a:bodyPr>
+            <a:normAutofit fontScale="92500" lnSpcReduction="10000"/>
+          </a:bodyPr>
           <a:lstStyle/>
           <a:p>
             <a:r>
+              <a:rPr lang="fr-FR" dirty="0" err="1"/>
+              <a:t>state_s</a:t>
+            </a:r>
+            <a:r>
               <a:rPr lang="fr-FR" dirty="0"/>
-              <a:t>Connexion</a:t>
-            </a:r>
-          </a:p>
-          <a:p>
+              <a:t> (table slot)</a:t>
+            </a:r>
+          </a:p>
+          <a:p>
+            <a:pPr lvl="1"/>
             <a:r>
               <a:rPr lang="fr-FR" dirty="0"/>
-              <a:t>Inscription</a:t>
-            </a:r>
-          </a:p>
-          <a:p>
+              <a:t>0 = disponible</a:t>
+            </a:r>
+          </a:p>
+          <a:p>
+            <a:pPr lvl="1"/>
             <a:r>
               <a:rPr lang="fr-FR" dirty="0"/>
-              <a:t>Réservation</a:t>
-            </a:r>
-          </a:p>
-          <a:p>
+              <a:t>1 = occupée</a:t>
+            </a:r>
+          </a:p>
+          <a:p>
+            <a:r>
+              <a:rPr lang="fr-FR" dirty="0" err="1"/>
+              <a:t>etat</a:t>
+            </a:r>
             <a:r>
               <a:rPr lang="fr-FR" dirty="0"/>
-              <a:t>Modification infos personnelles</a:t>
-            </a:r>
-          </a:p>
-          <a:p>
+              <a:t> (</a:t>
+            </a:r>
+            <a:r>
+              <a:rPr lang="fr-FR" dirty="0" err="1"/>
+              <a:t>reserve</a:t>
+            </a:r>
             <a:r>
               <a:rPr lang="fr-FR" dirty="0"/>
-              <a:t>Admin :</a:t>
-            </a:r>
-          </a:p>
-          <a:p>
-            <a:pPr lvl="2"/>
+              <a:t>)</a:t>
+            </a:r>
+          </a:p>
+          <a:p>
+            <a:pPr lvl="1"/>
             <a:r>
               <a:rPr lang="fr-FR" dirty="0"/>
-              <a:t>Acceptation/refus des demandes d’inscription</a:t>
-            </a:r>
-          </a:p>
-          <a:p>
-            <a:pPr lvl="2"/>
+              <a:t>0 = demande en cours</a:t>
+            </a:r>
+          </a:p>
+          <a:p>
+            <a:pPr lvl="1"/>
             <a:r>
               <a:rPr lang="fr-FR" dirty="0"/>
-              <a:t>Acceptation/refus des demandes de réservation</a:t>
-            </a:r>
-          </a:p>
-          <a:p>
-            <a:pPr marL="0" indent="0">
-              <a:buNone/>
-            </a:pPr>
+              <a:t>1 = demande acceptée</a:t>
+            </a:r>
+          </a:p>
+          <a:p>
+            <a:pPr lvl="1"/>
+            <a:r>
+              <a:rPr lang="fr-FR" dirty="0"/>
+              <a:t>2 = demande refusée</a:t>
+            </a:r>
+          </a:p>
+          <a:p>
+            <a:r>
+              <a:rPr lang="fr-FR" dirty="0" err="1"/>
+              <a:t>lvl</a:t>
+            </a:r>
+            <a:r>
+              <a:rPr lang="fr-FR" dirty="0"/>
+              <a:t> (user)</a:t>
+            </a:r>
+          </a:p>
+          <a:p>
+            <a:pPr lvl="1"/>
+            <a:r>
+              <a:rPr lang="fr-FR" dirty="0"/>
+              <a:t>0 = demande en cours</a:t>
+            </a:r>
+          </a:p>
+          <a:p>
+            <a:pPr lvl="1"/>
+            <a:r>
+              <a:rPr lang="fr-FR" dirty="0"/>
+              <a:t>1 = demande acceptée</a:t>
+            </a:r>
+          </a:p>
+          <a:p>
+            <a:pPr lvl="1"/>
+            <a:r>
+              <a:rPr lang="fr-FR"/>
+              <a:t>2 = admin</a:t>
+            </a:r>
             <a:endParaRPr lang="fr-FR" dirty="0"/>
           </a:p>
         </p:txBody>
@@ -8441,7 +8758,183 @@
     </p:spTree>
     <p:extLst>
       <p:ext uri="{BB962C8B-B14F-4D97-AF65-F5344CB8AC3E}">
-        <p14:creationId xmlns:p14="http://schemas.microsoft.com/office/powerpoint/2010/main" val="3947950285"/>
+        <p14:creationId xmlns:p14="http://schemas.microsoft.com/office/powerpoint/2010/main" val="1024202490"/>
+      </p:ext>
+    </p:extLst>
+  </p:cSld>
+  <p:clrMapOvr>
+    <a:masterClrMapping/>
+  </p:clrMapOvr>
+</p:sld>
+</file>
+
+<file path=ppt/slides/slide9.xml><?xml version="1.0" encoding="utf-8"?>
+<p:sld xmlns:a="http://schemas.openxmlformats.org/drawingml/2006/main" xmlns:r="http://schemas.openxmlformats.org/officeDocument/2006/relationships" xmlns:p="http://schemas.openxmlformats.org/presentationml/2006/main">
+  <p:cSld>
+    <p:spTree>
+      <p:nvGrpSpPr>
+        <p:cNvPr id="1" name=""/>
+        <p:cNvGrpSpPr/>
+        <p:nvPr/>
+      </p:nvGrpSpPr>
+      <p:grpSpPr>
+        <a:xfrm>
+          <a:off x="0" y="0"/>
+          <a:ext cx="0" cy="0"/>
+          <a:chOff x="0" y="0"/>
+          <a:chExt cx="0" cy="0"/>
+        </a:xfrm>
+      </p:grpSpPr>
+      <p:sp>
+        <p:nvSpPr>
+          <p:cNvPr id="2" name="Titre 1">
+            <a:extLst>
+              <a:ext uri="{FF2B5EF4-FFF2-40B4-BE49-F238E27FC236}">
+                <a16:creationId xmlns:a16="http://schemas.microsoft.com/office/drawing/2014/main" id="{DBAFFEDE-4760-4DD0-94A2-C2A60A431A36}"/>
+              </a:ext>
+            </a:extLst>
+          </p:cNvPr>
+          <p:cNvSpPr>
+            <a:spLocks noGrp="1"/>
+          </p:cNvSpPr>
+          <p:nvPr>
+            <p:ph type="title"/>
+          </p:nvPr>
+        </p:nvSpPr>
+        <p:spPr/>
+        <p:txBody>
+          <a:bodyPr/>
+          <a:lstStyle/>
+          <a:p>
+            <a:pPr algn="ctr"/>
+            <a:r>
+              <a:rPr lang="fr-FR" dirty="0"/>
+              <a:t>Liste des tâches à réaliser</a:t>
+            </a:r>
+          </a:p>
+        </p:txBody>
+      </p:sp>
+      <p:sp>
+        <p:nvSpPr>
+          <p:cNvPr id="3" name="Espace réservé du contenu 2">
+            <a:extLst>
+              <a:ext uri="{FF2B5EF4-FFF2-40B4-BE49-F238E27FC236}">
+                <a16:creationId xmlns:a16="http://schemas.microsoft.com/office/drawing/2014/main" id="{97480A3A-DB12-478A-8DCF-7BBD7557426E}"/>
+              </a:ext>
+            </a:extLst>
+          </p:cNvPr>
+          <p:cNvSpPr>
+            <a:spLocks noGrp="1"/>
+          </p:cNvSpPr>
+          <p:nvPr>
+            <p:ph idx="1"/>
+          </p:nvPr>
+        </p:nvSpPr>
+        <p:spPr>
+          <a:xfrm>
+            <a:off x="1806498" y="1405054"/>
+            <a:ext cx="9698114" cy="5084956"/>
+          </a:xfrm>
+        </p:spPr>
+        <p:txBody>
+          <a:bodyPr/>
+          <a:lstStyle/>
+          <a:p>
+            <a:r>
+              <a:rPr lang="fr-FR" dirty="0"/>
+              <a:t>Analyse des besoins en fonctions des demandes</a:t>
+            </a:r>
+          </a:p>
+          <a:p>
+            <a:r>
+              <a:rPr lang="fr-FR" dirty="0"/>
+              <a:t>Séparation et répartitions des tâches </a:t>
+            </a:r>
+          </a:p>
+          <a:p>
+            <a:r>
+              <a:rPr lang="fr-FR" dirty="0"/>
+              <a:t>Création de la base de données adaptée</a:t>
+            </a:r>
+          </a:p>
+          <a:p>
+            <a:r>
+              <a:rPr lang="fr-FR" dirty="0"/>
+              <a:t>Installation de GitHub</a:t>
+            </a:r>
+          </a:p>
+          <a:p>
+            <a:pPr lvl="1"/>
+            <a:r>
+              <a:rPr lang="fr-FR" dirty="0"/>
+              <a:t>Premier Commit avec la BDD et la première version de l’architecture</a:t>
+            </a:r>
+          </a:p>
+          <a:p>
+            <a:pPr lvl="1"/>
+            <a:r>
+              <a:rPr lang="fr-FR" dirty="0"/>
+              <a:t>Création du repository local dans chacun des PC des contributeurs</a:t>
+            </a:r>
+          </a:p>
+          <a:p>
+            <a:pPr indent="-285750"/>
+            <a:r>
+              <a:rPr lang="fr-FR" dirty="0"/>
+              <a:t>Création de la documentation qui sera mise à jour en même temps que les </a:t>
+            </a:r>
+            <a:r>
+              <a:rPr lang="fr-FR" dirty="0" err="1"/>
+              <a:t>modifs</a:t>
+            </a:r>
+            <a:endParaRPr lang="fr-FR" dirty="0"/>
+          </a:p>
+          <a:p>
+            <a:r>
+              <a:rPr lang="fr-FR" dirty="0"/>
+              <a:t>Création des premières pages (accueil, connexion, inscription, administration) accessibles selon le niveau utilisateurs (user or Admin)</a:t>
+            </a:r>
+          </a:p>
+          <a:p>
+            <a:r>
+              <a:rPr lang="fr-FR" dirty="0"/>
+              <a:t>Création des fonctionnalités demandés (réservation, attribution des places </a:t>
+            </a:r>
+            <a:r>
+              <a:rPr lang="fr-FR" dirty="0" err="1"/>
+              <a:t>etc</a:t>
+            </a:r>
+            <a:r>
+              <a:rPr lang="fr-FR" dirty="0"/>
+              <a:t>,)</a:t>
+            </a:r>
+          </a:p>
+          <a:p>
+            <a:r>
+              <a:rPr lang="fr-FR" dirty="0"/>
+              <a:t>Création du </a:t>
+            </a:r>
+            <a:r>
+              <a:rPr lang="fr-FR" dirty="0" err="1"/>
+              <a:t>powerpoint</a:t>
+            </a:r>
+            <a:endParaRPr lang="fr-FR" dirty="0"/>
+          </a:p>
+          <a:p>
+            <a:pPr marL="0" indent="0">
+              <a:buNone/>
+            </a:pPr>
+            <a:endParaRPr lang="fr-FR" dirty="0"/>
+          </a:p>
+          <a:p>
+            <a:endParaRPr lang="fr-FR" dirty="0"/>
+          </a:p>
+        </p:txBody>
+      </p:sp>
+    </p:spTree>
+    <p:extLst>
+      <p:ext uri="{BB962C8B-B14F-4D97-AF65-F5344CB8AC3E}">
+        <p14:creationId xmlns:p14="http://schemas.microsoft.com/office/powerpoint/2010/main" val="2247788577"/>
       </p:ext>
     </p:extLst>
   </p:cSld>

</xml_diff>